<commit_message>
サポートされるdotNETランタイム・バージョンを2.0 - 4.5.1から3.5 - 4.5.1に変更 (Changed to 3.5 to 4.5.1 from 2.0 to 4.5.1 the dotNET runtime version supported.)
</commit_message>
<xml_diff>
--- a/Introduction.pptx
+++ b/Introduction.pptx
@@ -427,7 +427,7 @@
     </p:spTree>
     <p:extLst>
       <p:ext uri="{BB962C8B-B14F-4D97-AF65-F5344CB8AC3E}">
-        <p14:creationId xmlns="" xmlns:p14="http://schemas.microsoft.com/office/powerpoint/2010/main" val="4085642230"/>
+        <p14:creationId xmlns:p14="http://schemas.microsoft.com/office/powerpoint/2010/main" xmlns="" val="4085642230"/>
       </p:ext>
     </p:extLst>
   </p:cSld>
@@ -810,7 +810,7 @@
     </p:spTree>
     <p:extLst>
       <p:ext uri="{BB962C8B-B14F-4D97-AF65-F5344CB8AC3E}">
-        <p14:creationId xmlns="" xmlns:p14="http://schemas.microsoft.com/office/powerpoint/2010/main" val="3928537031"/>
+        <p14:creationId xmlns:p14="http://schemas.microsoft.com/office/powerpoint/2010/main" xmlns="" val="3928537031"/>
       </p:ext>
     </p:extLst>
   </p:cSld>
@@ -4369,7 +4369,7 @@
           <p:nvPr>
             <p:extLst>
               <p:ext uri="{D42A27DB-BD31-4B8C-83A1-F6EECF244321}">
-                <p14:modId xmlns="" xmlns:p14="http://schemas.microsoft.com/office/powerpoint/2010/main" val="1965624729"/>
+                <p14:modId xmlns:p14="http://schemas.microsoft.com/office/powerpoint/2010/main" xmlns="" val="1965624729"/>
               </p:ext>
             </p:extLst>
           </p:nvPr>
@@ -7652,15 +7652,7 @@
                   <a:schemeClr val="accent6"/>
                 </a:solidFill>
               </a:rPr>
-              <a:t>　この準備作業</a:t>
-            </a:r>
-            <a:r>
-              <a:rPr lang="ja-JP" altLang="en-US" sz="2000" dirty="0" smtClean="0">
-                <a:solidFill>
-                  <a:schemeClr val="accent6"/>
-                </a:solidFill>
-              </a:rPr>
-              <a:t>を容易にする</a:t>
+              <a:t>　この準備作業を容易にする</a:t>
             </a:r>
             <a:r>
               <a:rPr lang="en-US" altLang="ja-JP" sz="2000" dirty="0" smtClean="0">
@@ -12017,11 +12009,7 @@
             </a:pPr>
             <a:r>
               <a:rPr kumimoji="0" lang="ja-JP" altLang="en-US" sz="1800" dirty="0" smtClean="0"/>
-              <a:t>設定ファイル</a:t>
-            </a:r>
-            <a:r>
-              <a:rPr kumimoji="0" lang="ja-JP" altLang="en-US" sz="1800" dirty="0" smtClean="0"/>
-              <a:t>の</a:t>
+              <a:t>設定ファイルの</a:t>
             </a:r>
             <a:endParaRPr kumimoji="0" lang="en-US" altLang="ja-JP" sz="1800" dirty="0" smtClean="0"/>
           </a:p>
@@ -12033,15 +12021,7 @@
             </a:pPr>
             <a:r>
               <a:rPr kumimoji="0" lang="ja-JP" altLang="en-US" sz="1800" dirty="0" smtClean="0"/>
-              <a:t>変更</a:t>
-            </a:r>
-            <a:r>
-              <a:rPr kumimoji="0" lang="ja-JP" altLang="en-US" sz="1800" dirty="0" smtClean="0"/>
-              <a:t>のみで</a:t>
-            </a:r>
-            <a:r>
-              <a:rPr kumimoji="0" lang="ja-JP" altLang="en-US" sz="1800" dirty="0" smtClean="0"/>
-              <a:t>対応可能</a:t>
+              <a:t>変更のみで対応可能</a:t>
             </a:r>
             <a:endParaRPr kumimoji="0" lang="en-US" altLang="ja-JP" sz="1800" dirty="0"/>
           </a:p>
@@ -30430,11 +30410,7 @@
             </a:r>
             <a:r>
               <a:rPr lang="ja-JP" altLang="en-US" sz="2000" dirty="0" smtClean="0"/>
-              <a:t>ユーザが、棟梁を使うことにより、企業競争力や技術力が向上することに少しでも貢献できれば幸いです</a:t>
-            </a:r>
-            <a:r>
-              <a:rPr lang="ja-JP" altLang="en-US" sz="2000" dirty="0" smtClean="0"/>
-              <a:t>。</a:t>
+              <a:t>ユーザが、棟梁を使うことにより、企業競争力や技術力が向上することに少しでも貢献できれば幸いです。</a:t>
             </a:r>
             <a:endParaRPr lang="en-US" altLang="ja-JP" sz="2000" dirty="0" smtClean="0"/>
           </a:p>
@@ -31652,15 +31628,7 @@
             </a:pPr>
             <a:r>
               <a:rPr lang="en-US" altLang="ja-JP" sz="3200" b="1" dirty="0" smtClean="0"/>
-              <a:t>4</a:t>
-            </a:r>
-            <a:r>
-              <a:rPr lang="en-US" altLang="ja-JP" sz="3200" b="1" dirty="0" smtClean="0"/>
-              <a:t>. </a:t>
-            </a:r>
-            <a:r>
-              <a:rPr lang="en-US" altLang="ja-JP" sz="3200" b="1" dirty="0" smtClean="0"/>
-              <a:t>D</a:t>
+              <a:t>4. D</a:t>
             </a:r>
             <a:r>
               <a:rPr lang="ja-JP" altLang="en-US" sz="3200" dirty="0"/>
@@ -43940,7 +43908,11 @@
             </a:r>
             <a:r>
               <a:rPr lang="en-US" altLang="ja-JP" dirty="0"/>
-              <a:t>.NET Framework 2.0 </a:t>
+              <a:t>.NET Framework </a:t>
+            </a:r>
+            <a:r>
+              <a:rPr lang="en-US" altLang="ja-JP" dirty="0" smtClean="0"/>
+              <a:t>3.5 </a:t>
             </a:r>
             <a:r>
               <a:rPr lang="ja-JP" altLang="en-US" dirty="0"/>
@@ -44115,7 +44087,11 @@
             </a:r>
             <a:r>
               <a:rPr lang="en-US" altLang="ja-JP" sz="2000" dirty="0" smtClean="0"/>
-              <a:t>source	: Apache License, Version 2.0</a:t>
+              <a:t>source		: </a:t>
+            </a:r>
+            <a:r>
+              <a:rPr lang="en-US" altLang="ja-JP" sz="2000" dirty="0" smtClean="0"/>
+              <a:t>Apache License, Version 2.0</a:t>
             </a:r>
           </a:p>
           <a:p>
@@ -44172,7 +44148,7 @@
           <p:nvPr>
             <p:extLst>
               <p:ext uri="{D42A27DB-BD31-4B8C-83A1-F6EECF244321}">
-                <p14:modId xmlns="" xmlns:p14="http://schemas.microsoft.com/office/powerpoint/2010/main" val="2614244416"/>
+                <p14:modId xmlns:p14="http://schemas.microsoft.com/office/powerpoint/2010/main" xmlns="" val="2614244416"/>
               </p:ext>
             </p:extLst>
           </p:nvPr>
@@ -44981,7 +44957,52 @@
                           <a:ea typeface="HGP創英角ｺﾞｼｯｸUB" pitchFamily="50" charset="-128"/>
                           <a:cs typeface="Times New Roman" pitchFamily="18" charset="0"/>
                         </a:rPr>
-                        <a:t> .NET Framework 2.0 – 4.5.1</a:t>
+                        <a:t> .NET </a:t>
+                      </a:r>
+                      <a:r>
+                        <a:rPr kumimoji="1" lang="en-US" altLang="ja-JP" sz="1800" b="0" i="0" u="none" strike="noStrike" cap="none" normalizeH="0" baseline="0" smtClean="0">
+                          <a:ln>
+                            <a:noFill/>
+                          </a:ln>
+                          <a:solidFill>
+                            <a:schemeClr val="tx1"/>
+                          </a:solidFill>
+                          <a:effectLst/>
+                          <a:latin typeface="Verdana" pitchFamily="34" charset="0"/>
+                          <a:ea typeface="HGP創英角ｺﾞｼｯｸUB" pitchFamily="50" charset="-128"/>
+                          <a:cs typeface="Times New Roman" pitchFamily="18" charset="0"/>
+                        </a:rPr>
+                        <a:t>Framework </a:t>
+                      </a:r>
+                      <a:r>
+                        <a:rPr kumimoji="1" lang="en-US" altLang="ja-JP" sz="1800" b="0" i="0" u="none" strike="noStrike" cap="none" normalizeH="0" baseline="0" smtClean="0">
+                          <a:ln>
+                            <a:noFill/>
+                          </a:ln>
+                          <a:solidFill>
+                            <a:schemeClr val="tx1"/>
+                          </a:solidFill>
+                          <a:effectLst/>
+                          <a:latin typeface="Verdana" pitchFamily="34" charset="0"/>
+                          <a:ea typeface="HGP創英角ｺﾞｼｯｸUB" pitchFamily="50" charset="-128"/>
+                          <a:cs typeface="Times New Roman" pitchFamily="18" charset="0"/>
+                        </a:rPr>
+                        <a:t>3.5 </a:t>
+                      </a:r>
+                      <a:r>
+                        <a:rPr kumimoji="1" lang="en-US" altLang="ja-JP" sz="1800" b="0" i="0" u="none" strike="noStrike" cap="none" normalizeH="0" baseline="0" dirty="0" smtClean="0">
+                          <a:ln>
+                            <a:noFill/>
+                          </a:ln>
+                          <a:solidFill>
+                            <a:schemeClr val="tx1"/>
+                          </a:solidFill>
+                          <a:effectLst/>
+                          <a:latin typeface="Verdana" pitchFamily="34" charset="0"/>
+                          <a:ea typeface="HGP創英角ｺﾞｼｯｸUB" pitchFamily="50" charset="-128"/>
+                          <a:cs typeface="Times New Roman" pitchFamily="18" charset="0"/>
+                        </a:rPr>
+                        <a:t>– 4.5.1</a:t>
                       </a:r>
                       <a:endParaRPr kumimoji="1" lang="ja-JP" altLang="en-US" sz="1800" b="0" i="0" u="none" strike="noStrike" cap="none" normalizeH="0" baseline="0" dirty="0" smtClean="0">
                         <a:ln>
@@ -49156,7 +49177,7 @@
           <p:nvPr>
             <p:extLst>
               <p:ext uri="{D42A27DB-BD31-4B8C-83A1-F6EECF244321}">
-                <p14:modId xmlns="" xmlns:p14="http://schemas.microsoft.com/office/powerpoint/2010/main" val="592932253"/>
+                <p14:modId xmlns:p14="http://schemas.microsoft.com/office/powerpoint/2010/main" xmlns="" val="592932253"/>
               </p:ext>
             </p:extLst>
           </p:nvPr>

</xml_diff>